<commit_message>
obs space non più bool perche per riprodurre il paper alcuni hanno range piu grandi
</commit_message>
<xml_diff>
--- a/IRS.pptx
+++ b/IRS.pptx
@@ -148,25 +148,7 @@
               <a:rPr b="0" lang="it-IT" sz="2000" spc="-1" strike="noStrike">
                 <a:latin typeface="Arial"/>
               </a:rPr>
-              <a:t>Fai clic per </a:t>
-            </a:r>
-            <a:r>
-              <a:rPr b="0" lang="it-IT" sz="2000" spc="-1" strike="noStrike">
-                <a:latin typeface="Arial"/>
-              </a:rPr>
-              <a:t>modificare il </a:t>
-            </a:r>
-            <a:r>
-              <a:rPr b="0" lang="it-IT" sz="2000" spc="-1" strike="noStrike">
-                <a:latin typeface="Arial"/>
-              </a:rPr>
-              <a:t>formato </a:t>
-            </a:r>
-            <a:r>
-              <a:rPr b="0" lang="it-IT" sz="2000" spc="-1" strike="noStrike">
-                <a:latin typeface="Arial"/>
-              </a:rPr>
-              <a:t>delle note</a:t>
+              <a:t>Fai clic per modificare il formato delle note</a:t>
             </a:r>
             <a:endParaRPr b="0" lang="it-IT" sz="2000" spc="-1" strike="noStrike">
               <a:latin typeface="Arial"/>
@@ -351,7 +333,7 @@
             <a:pPr algn="r">
               <a:buNone/>
             </a:pPr>
-            <a:fld id="{0EC94B61-1C61-44C2-9379-254DB36B59D1}" type="slidenum">
+            <a:fld id="{18C5B60C-2133-46BB-9B9F-195F55E294E0}" type="slidenum">
               <a:rPr b="0" lang="it-IT" sz="1400" spc="-1" strike="noStrike">
                 <a:latin typeface="Times New Roman"/>
               </a:rPr>
@@ -388,7 +370,7 @@
       </p:grpSpPr>
       <p:sp>
         <p:nvSpPr>
-          <p:cNvPr id="132" name="PlaceHolder 1"/>
+          <p:cNvPr id="134" name="PlaceHolder 1"/>
           <p:cNvSpPr>
             <a:spLocks noGrp="1"/>
           </p:cNvSpPr>
@@ -411,7 +393,7 @@
       </p:sp>
       <p:sp>
         <p:nvSpPr>
-          <p:cNvPr id="133" name="PlaceHolder 2"/>
+          <p:cNvPr id="135" name="PlaceHolder 2"/>
           <p:cNvSpPr>
             <a:spLocks noGrp="1"/>
           </p:cNvSpPr>
@@ -678,7 +660,7 @@
       </p:sp>
       <p:sp>
         <p:nvSpPr>
-          <p:cNvPr id="134" name="PlaceHolder 3"/>
+          <p:cNvPr id="136" name="PlaceHolder 3"/>
           <p:cNvSpPr>
             <a:spLocks noGrp="1"/>
           </p:cNvSpPr>
@@ -725,7 +707,7 @@
               </a:lnSpc>
               <a:buNone/>
             </a:pPr>
-            <a:fld id="{0DB45C2F-D72A-411B-9FA4-596986CF7D9F}" type="slidenum">
+            <a:fld id="{6AB78D0A-0F08-4816-AB43-6E9C7388BE3A}" type="slidenum">
               <a:rPr b="0" lang="it-IT" sz="1200" spc="-1" strike="noStrike">
                 <a:solidFill>
                   <a:srgbClr val="000000"/>
@@ -765,7 +747,7 @@
       </p:grpSpPr>
       <p:sp>
         <p:nvSpPr>
-          <p:cNvPr id="135" name="PlaceHolder 1"/>
+          <p:cNvPr id="137" name="PlaceHolder 1"/>
           <p:cNvSpPr>
             <a:spLocks noGrp="1"/>
           </p:cNvSpPr>
@@ -788,7 +770,7 @@
       </p:sp>
       <p:sp>
         <p:nvSpPr>
-          <p:cNvPr id="136" name="PlaceHolder 2"/>
+          <p:cNvPr id="138" name="PlaceHolder 2"/>
           <p:cNvSpPr>
             <a:spLocks noGrp="1"/>
           </p:cNvSpPr>
@@ -1055,7 +1037,7 @@
       </p:sp>
       <p:sp>
         <p:nvSpPr>
-          <p:cNvPr id="137" name="PlaceHolder 3"/>
+          <p:cNvPr id="139" name="PlaceHolder 3"/>
           <p:cNvSpPr>
             <a:spLocks noGrp="1"/>
           </p:cNvSpPr>
@@ -1102,7 +1084,7 @@
               </a:lnSpc>
               <a:buNone/>
             </a:pPr>
-            <a:fld id="{2A846EB9-719D-4F65-98A0-EB014E9D4BE2}" type="slidenum">
+            <a:fld id="{3A70FDEE-5F1A-4A96-B18E-614B9D457A1F}" type="slidenum">
               <a:rPr b="0" lang="it-IT" sz="1200" spc="-1" strike="noStrike">
                 <a:solidFill>
                   <a:srgbClr val="000000"/>
@@ -1142,7 +1124,7 @@
       </p:grpSpPr>
       <p:sp>
         <p:nvSpPr>
-          <p:cNvPr id="138" name="PlaceHolder 1"/>
+          <p:cNvPr id="140" name="PlaceHolder 1"/>
           <p:cNvSpPr>
             <a:spLocks noGrp="1"/>
           </p:cNvSpPr>
@@ -1165,7 +1147,7 @@
       </p:sp>
       <p:sp>
         <p:nvSpPr>
-          <p:cNvPr id="139" name="PlaceHolder 2"/>
+          <p:cNvPr id="141" name="PlaceHolder 2"/>
           <p:cNvSpPr>
             <a:spLocks noGrp="1"/>
           </p:cNvSpPr>
@@ -1432,7 +1414,7 @@
       </p:sp>
       <p:sp>
         <p:nvSpPr>
-          <p:cNvPr id="140" name="PlaceHolder 3"/>
+          <p:cNvPr id="142" name="PlaceHolder 3"/>
           <p:cNvSpPr>
             <a:spLocks noGrp="1"/>
           </p:cNvSpPr>
@@ -1479,7 +1461,7 @@
               </a:lnSpc>
               <a:buNone/>
             </a:pPr>
-            <a:fld id="{543FE6B7-F6AC-485C-AD66-6C00BDCBE51B}" type="slidenum">
+            <a:fld id="{BA017635-EEF9-47C8-9D19-7C2496174E0E}" type="slidenum">
               <a:rPr b="0" lang="it-IT" sz="1200" spc="-1" strike="noStrike">
                 <a:solidFill>
                   <a:srgbClr val="000000"/>
@@ -1519,7 +1501,7 @@
       </p:grpSpPr>
       <p:sp>
         <p:nvSpPr>
-          <p:cNvPr id="141" name="PlaceHolder 1"/>
+          <p:cNvPr id="143" name="PlaceHolder 1"/>
           <p:cNvSpPr>
             <a:spLocks noGrp="1"/>
           </p:cNvSpPr>
@@ -1542,7 +1524,7 @@
       </p:sp>
       <p:sp>
         <p:nvSpPr>
-          <p:cNvPr id="142" name="PlaceHolder 2"/>
+          <p:cNvPr id="144" name="PlaceHolder 2"/>
           <p:cNvSpPr>
             <a:spLocks noGrp="1"/>
           </p:cNvSpPr>
@@ -1581,211 +1563,31 @@
               <a:rPr b="0" lang="it-IT" sz="2000" spc="-1" strike="noStrike">
                 <a:latin typeface="Arial"/>
               </a:rPr>
-              <a:t>Per usare la </a:t>
-            </a:r>
-            <a:r>
-              <a:rPr b="0" lang="it-IT" sz="2000" spc="-1" strike="noStrike">
-                <a:latin typeface="Arial"/>
-              </a:rPr>
-              <a:t>diapositiva </a:t>
-            </a:r>
-            <a:r>
-              <a:rPr b="0" lang="it-IT" sz="2000" spc="-1" strike="noStrike">
-                <a:latin typeface="Arial"/>
-              </a:rPr>
-              <a:t>di </a:t>
-            </a:r>
-            <a:r>
-              <a:rPr b="0" lang="it-IT" sz="2000" spc="-1" strike="noStrike">
-                <a:latin typeface="Arial"/>
-              </a:rPr>
-              <a:t>animazione </a:t>
-            </a:r>
-            <a:r>
-              <a:rPr b="0" lang="it-IT" sz="2000" spc="-1" strike="noStrike">
-                <a:latin typeface="Arial"/>
-              </a:rPr>
-              <a:t>del titolo </a:t>
-            </a:r>
-            <a:r>
-              <a:rPr b="0" lang="it-IT" sz="2000" spc="-1" strike="noStrike">
-                <a:latin typeface="Arial"/>
-              </a:rPr>
-              <a:t>con una </a:t>
-            </a:r>
-            <a:r>
-              <a:rPr b="0" lang="it-IT" sz="2000" spc="-1" strike="noStrike">
-                <a:latin typeface="Arial"/>
-              </a:rPr>
-              <a:t>nuova </a:t>
-            </a:r>
-            <a:r>
-              <a:rPr b="0" lang="it-IT" sz="2000" spc="-1" strike="noStrike">
-                <a:latin typeface="Arial"/>
-              </a:rPr>
-              <a:t>immagine è </a:t>
-            </a:r>
-            <a:r>
-              <a:rPr b="0" lang="it-IT" sz="2000" spc="-1" strike="noStrike">
-                <a:latin typeface="Arial"/>
-              </a:rPr>
-              <a:t>sufficiente </a:t>
-            </a:r>
-            <a:r>
-              <a:rPr b="0" lang="it-IT" sz="2000" spc="-1" strike="noStrike">
-                <a:latin typeface="Arial"/>
-              </a:rPr>
-              <a:t>1) spostare </a:t>
-            </a:r>
-            <a:r>
-              <a:rPr b="0" lang="it-IT" sz="2000" spc="-1" strike="noStrike">
-                <a:latin typeface="Arial"/>
-              </a:rPr>
-              <a:t>di lato la </a:t>
-            </a:r>
-            <a:r>
-              <a:rPr b="0" lang="it-IT" sz="2000" spc="-1" strike="noStrike">
-                <a:latin typeface="Arial"/>
-              </a:rPr>
-              <a:t>parte </a:t>
-            </a:r>
-            <a:r>
-              <a:rPr b="0" lang="it-IT" sz="2000" spc="-1" strike="noStrike">
-                <a:latin typeface="Arial"/>
-              </a:rPr>
-              <a:t>superiore </a:t>
-            </a:r>
-            <a:r>
-              <a:rPr b="0" lang="it-IT" sz="2000" spc="-1" strike="noStrike">
-                <a:latin typeface="Arial"/>
-              </a:rPr>
-              <a:t>della forma </a:t>
-            </a:r>
-            <a:r>
-              <a:rPr b="0" lang="it-IT" sz="2000" spc="-1" strike="noStrike">
-                <a:latin typeface="Arial"/>
-              </a:rPr>
-              <a:t>semitraspar</a:t>
-            </a:r>
-            <a:r>
-              <a:rPr b="0" lang="it-IT" sz="2000" spc="-1" strike="noStrike">
-                <a:latin typeface="Arial"/>
-              </a:rPr>
-              <a:t>ente, 2) </a:t>
-            </a:r>
-            <a:r>
-              <a:rPr b="0" lang="it-IT" sz="2000" spc="-1" strike="noStrike">
-                <a:latin typeface="Arial"/>
-              </a:rPr>
-              <a:t>eliminare </a:t>
-            </a:r>
-            <a:r>
-              <a:rPr b="0" lang="it-IT" sz="2000" spc="-1" strike="noStrike">
-                <a:latin typeface="Arial"/>
-              </a:rPr>
-              <a:t>l'immagine </a:t>
-            </a:r>
-            <a:r>
-              <a:rPr b="0" lang="it-IT" sz="2000" spc="-1" strike="noStrike">
-                <a:latin typeface="Arial"/>
-              </a:rPr>
-              <a:t>segnaposto, </a:t>
-            </a:r>
-            <a:r>
-              <a:rPr b="0" lang="it-IT" sz="2000" spc="-1" strike="noStrike">
-                <a:latin typeface="Arial"/>
-              </a:rPr>
-              <a:t>3) fare clic </a:t>
-            </a:r>
-            <a:r>
-              <a:rPr b="0" lang="it-IT" sz="2000" spc="-1" strike="noStrike">
-                <a:latin typeface="Arial"/>
-              </a:rPr>
-              <a:t>sull'icona </a:t>
-            </a:r>
-            <a:r>
-              <a:rPr b="0" lang="it-IT" sz="2000" spc="-1" strike="noStrike">
-                <a:latin typeface="Arial"/>
-              </a:rPr>
-              <a:t>dell'immagin</a:t>
-            </a:r>
-            <a:r>
-              <a:rPr b="0" lang="it-IT" sz="2000" spc="-1" strike="noStrike">
-                <a:latin typeface="Arial"/>
-              </a:rPr>
-              <a:t>e per </a:t>
-            </a:r>
-            <a:r>
-              <a:rPr b="0" lang="it-IT" sz="2000" spc="-1" strike="noStrike">
-                <a:latin typeface="Arial"/>
-              </a:rPr>
-              <a:t>aggiungere </a:t>
-            </a:r>
-            <a:r>
-              <a:rPr b="0" lang="it-IT" sz="2000" spc="-1" strike="noStrike">
-                <a:latin typeface="Arial"/>
-              </a:rPr>
-              <a:t>una nuova </a:t>
-            </a:r>
-            <a:r>
-              <a:rPr b="0" lang="it-IT" sz="2000" spc="-1" strike="noStrike">
-                <a:latin typeface="Arial"/>
-              </a:rPr>
-              <a:t>immagine, </a:t>
-            </a:r>
-            <a:r>
-              <a:rPr b="0" lang="it-IT" sz="2000" spc="-1" strike="noStrike">
-                <a:latin typeface="Arial"/>
-              </a:rPr>
-              <a:t>4) spostare </a:t>
-            </a:r>
-            <a:r>
-              <a:rPr b="0" lang="it-IT" sz="2000" spc="-1" strike="noStrike">
-                <a:latin typeface="Arial"/>
-              </a:rPr>
-              <a:t>la forma </a:t>
-            </a:r>
-            <a:r>
-              <a:rPr b="0" lang="it-IT" sz="2000" spc="-1" strike="noStrike">
-                <a:latin typeface="Arial"/>
-              </a:rPr>
-              <a:t>semitraspar</a:t>
-            </a:r>
-            <a:r>
-              <a:rPr b="0" lang="it-IT" sz="2000" spc="-1" strike="noStrike">
-                <a:latin typeface="Arial"/>
-              </a:rPr>
-              <a:t>ente nella </a:t>
-            </a:r>
-            <a:r>
-              <a:rPr b="0" lang="it-IT" sz="2000" spc="-1" strike="noStrike">
-                <a:latin typeface="Arial"/>
-              </a:rPr>
-              <a:t>posizione </a:t>
-            </a:r>
-            <a:r>
-              <a:rPr b="0" lang="it-IT" sz="2000" spc="-1" strike="noStrike">
-                <a:latin typeface="Arial"/>
-              </a:rPr>
-              <a:t>originaria, 5) </a:t>
-            </a:r>
-            <a:r>
-              <a:rPr b="0" lang="it-IT" sz="2000" spc="-1" strike="noStrike">
-                <a:latin typeface="Arial"/>
-              </a:rPr>
-              <a:t>aggiornare il </a:t>
-            </a:r>
-            <a:r>
-              <a:rPr b="0" lang="it-IT" sz="2000" spc="-1" strike="noStrike">
-                <a:latin typeface="Arial"/>
-              </a:rPr>
-              <a:t>testo nella </a:t>
-            </a:r>
-            <a:r>
-              <a:rPr b="0" lang="it-IT" sz="2000" spc="-1" strike="noStrike">
-                <a:latin typeface="Arial"/>
-              </a:rPr>
-              <a:t>diapositiva.</a:t>
+              <a:t>Per usare la diapositiva di animazione del titolo con una nuova immagine è </a:t>
+            </a:r>
+            <a:r>
+              <a:rPr b="0" lang="it-IT" sz="2000" spc="-1" strike="noStrike">
+                <a:latin typeface="Arial"/>
+              </a:rPr>
+              <a:t>sufficiente 1) spostare di lato la parte superiore della forma semitrasparente, 2) </a:t>
+            </a:r>
+            <a:r>
+              <a:rPr b="0" lang="it-IT" sz="2000" spc="-1" strike="noStrike">
+                <a:latin typeface="Arial"/>
+              </a:rPr>
+              <a:t>eliminare l'immagine segnaposto, 3) fare clic sull'icona dell'immagine per </a:t>
+            </a:r>
+            <a:r>
+              <a:rPr b="0" lang="it-IT" sz="2000" spc="-1" strike="noStrike">
+                <a:latin typeface="Arial"/>
+              </a:rPr>
+              <a:t>aggiungere una nuova immagine, 4) spostare la forma semitrasparente nella </a:t>
+            </a:r>
+            <a:r>
+              <a:rPr b="0" lang="it-IT" sz="2000" spc="-1" strike="noStrike">
+                <a:latin typeface="Arial"/>
+              </a:rPr>
+              <a:t>posizione originaria, 5) aggiornare il testo nella diapositiva.</a:t>
             </a:r>
             <a:endParaRPr b="0" lang="it-IT" sz="2000" spc="-1" strike="noStrike">
               <a:latin typeface="Arial"/>
@@ -1809,7 +1611,7 @@
       </p:sp>
       <p:sp>
         <p:nvSpPr>
-          <p:cNvPr id="143" name="PlaceHolder 3"/>
+          <p:cNvPr id="145" name="PlaceHolder 3"/>
           <p:cNvSpPr>
             <a:spLocks noGrp="1"/>
           </p:cNvSpPr>
@@ -1856,7 +1658,7 @@
               </a:lnSpc>
               <a:buNone/>
             </a:pPr>
-            <a:fld id="{9F088092-B279-46A0-9ADB-D28CF30DB30A}" type="slidenum">
+            <a:fld id="{9450AF78-1665-49B4-91A5-E2F44F909E7A}" type="slidenum">
               <a:rPr b="0" lang="it-IT" sz="1200" spc="-1" strike="noStrike">
                 <a:solidFill>
                   <a:srgbClr val="000000"/>
@@ -1864,7 +1666,7 @@
                 <a:latin typeface="+mn-lt"/>
                 <a:ea typeface="+mn-ea"/>
               </a:rPr>
-              <a:t>5</a:t>
+              <a:t>&lt;numero&gt;</a:t>
             </a:fld>
             <a:endParaRPr b="0" lang="it-IT" sz="1200" spc="-1" strike="noStrike">
               <a:latin typeface="Times New Roman"/>
@@ -1896,7 +1698,7 @@
       </p:grpSpPr>
       <p:sp>
         <p:nvSpPr>
-          <p:cNvPr id="144" name="PlaceHolder 1"/>
+          <p:cNvPr id="146" name="PlaceHolder 1"/>
           <p:cNvSpPr>
             <a:spLocks noGrp="1"/>
           </p:cNvSpPr>
@@ -1919,7 +1721,7 @@
       </p:sp>
       <p:sp>
         <p:nvSpPr>
-          <p:cNvPr id="145" name="PlaceHolder 2"/>
+          <p:cNvPr id="147" name="PlaceHolder 2"/>
           <p:cNvSpPr>
             <a:spLocks noGrp="1"/>
           </p:cNvSpPr>
@@ -1958,211 +1760,7 @@
               <a:rPr b="0" lang="it-IT" sz="2000" spc="-1" strike="noStrike">
                 <a:latin typeface="Arial"/>
               </a:rPr>
-              <a:t>Per usare la </a:t>
-            </a:r>
-            <a:r>
-              <a:rPr b="0" lang="it-IT" sz="2000" spc="-1" strike="noStrike">
-                <a:latin typeface="Arial"/>
-              </a:rPr>
-              <a:t>diapositiva </a:t>
-            </a:r>
-            <a:r>
-              <a:rPr b="0" lang="it-IT" sz="2000" spc="-1" strike="noStrike">
-                <a:latin typeface="Arial"/>
-              </a:rPr>
-              <a:t>di </a:t>
-            </a:r>
-            <a:r>
-              <a:rPr b="0" lang="it-IT" sz="2000" spc="-1" strike="noStrike">
-                <a:latin typeface="Arial"/>
-              </a:rPr>
-              <a:t>animazione </a:t>
-            </a:r>
-            <a:r>
-              <a:rPr b="0" lang="it-IT" sz="2000" spc="-1" strike="noStrike">
-                <a:latin typeface="Arial"/>
-              </a:rPr>
-              <a:t>del titolo </a:t>
-            </a:r>
-            <a:r>
-              <a:rPr b="0" lang="it-IT" sz="2000" spc="-1" strike="noStrike">
-                <a:latin typeface="Arial"/>
-              </a:rPr>
-              <a:t>con una </a:t>
-            </a:r>
-            <a:r>
-              <a:rPr b="0" lang="it-IT" sz="2000" spc="-1" strike="noStrike">
-                <a:latin typeface="Arial"/>
-              </a:rPr>
-              <a:t>nuova </a:t>
-            </a:r>
-            <a:r>
-              <a:rPr b="0" lang="it-IT" sz="2000" spc="-1" strike="noStrike">
-                <a:latin typeface="Arial"/>
-              </a:rPr>
-              <a:t>immagine è </a:t>
-            </a:r>
-            <a:r>
-              <a:rPr b="0" lang="it-IT" sz="2000" spc="-1" strike="noStrike">
-                <a:latin typeface="Arial"/>
-              </a:rPr>
-              <a:t>sufficiente </a:t>
-            </a:r>
-            <a:r>
-              <a:rPr b="0" lang="it-IT" sz="2000" spc="-1" strike="noStrike">
-                <a:latin typeface="Arial"/>
-              </a:rPr>
-              <a:t>1) spostare </a:t>
-            </a:r>
-            <a:r>
-              <a:rPr b="0" lang="it-IT" sz="2000" spc="-1" strike="noStrike">
-                <a:latin typeface="Arial"/>
-              </a:rPr>
-              <a:t>di lato la </a:t>
-            </a:r>
-            <a:r>
-              <a:rPr b="0" lang="it-IT" sz="2000" spc="-1" strike="noStrike">
-                <a:latin typeface="Arial"/>
-              </a:rPr>
-              <a:t>parte </a:t>
-            </a:r>
-            <a:r>
-              <a:rPr b="0" lang="it-IT" sz="2000" spc="-1" strike="noStrike">
-                <a:latin typeface="Arial"/>
-              </a:rPr>
-              <a:t>superiore </a:t>
-            </a:r>
-            <a:r>
-              <a:rPr b="0" lang="it-IT" sz="2000" spc="-1" strike="noStrike">
-                <a:latin typeface="Arial"/>
-              </a:rPr>
-              <a:t>della forma </a:t>
-            </a:r>
-            <a:r>
-              <a:rPr b="0" lang="it-IT" sz="2000" spc="-1" strike="noStrike">
-                <a:latin typeface="Arial"/>
-              </a:rPr>
-              <a:t>semitraspar</a:t>
-            </a:r>
-            <a:r>
-              <a:rPr b="0" lang="it-IT" sz="2000" spc="-1" strike="noStrike">
-                <a:latin typeface="Arial"/>
-              </a:rPr>
-              <a:t>ente, 2) </a:t>
-            </a:r>
-            <a:r>
-              <a:rPr b="0" lang="it-IT" sz="2000" spc="-1" strike="noStrike">
-                <a:latin typeface="Arial"/>
-              </a:rPr>
-              <a:t>eliminare </a:t>
-            </a:r>
-            <a:r>
-              <a:rPr b="0" lang="it-IT" sz="2000" spc="-1" strike="noStrike">
-                <a:latin typeface="Arial"/>
-              </a:rPr>
-              <a:t>l'immagine </a:t>
-            </a:r>
-            <a:r>
-              <a:rPr b="0" lang="it-IT" sz="2000" spc="-1" strike="noStrike">
-                <a:latin typeface="Arial"/>
-              </a:rPr>
-              <a:t>segnaposto, </a:t>
-            </a:r>
-            <a:r>
-              <a:rPr b="0" lang="it-IT" sz="2000" spc="-1" strike="noStrike">
-                <a:latin typeface="Arial"/>
-              </a:rPr>
-              <a:t>3) fare clic </a:t>
-            </a:r>
-            <a:r>
-              <a:rPr b="0" lang="it-IT" sz="2000" spc="-1" strike="noStrike">
-                <a:latin typeface="Arial"/>
-              </a:rPr>
-              <a:t>sull'icona </a:t>
-            </a:r>
-            <a:r>
-              <a:rPr b="0" lang="it-IT" sz="2000" spc="-1" strike="noStrike">
-                <a:latin typeface="Arial"/>
-              </a:rPr>
-              <a:t>dell'immagin</a:t>
-            </a:r>
-            <a:r>
-              <a:rPr b="0" lang="it-IT" sz="2000" spc="-1" strike="noStrike">
-                <a:latin typeface="Arial"/>
-              </a:rPr>
-              <a:t>e per </a:t>
-            </a:r>
-            <a:r>
-              <a:rPr b="0" lang="it-IT" sz="2000" spc="-1" strike="noStrike">
-                <a:latin typeface="Arial"/>
-              </a:rPr>
-              <a:t>aggiungere </a:t>
-            </a:r>
-            <a:r>
-              <a:rPr b="0" lang="it-IT" sz="2000" spc="-1" strike="noStrike">
-                <a:latin typeface="Arial"/>
-              </a:rPr>
-              <a:t>una nuova </a:t>
-            </a:r>
-            <a:r>
-              <a:rPr b="0" lang="it-IT" sz="2000" spc="-1" strike="noStrike">
-                <a:latin typeface="Arial"/>
-              </a:rPr>
-              <a:t>immagine, </a:t>
-            </a:r>
-            <a:r>
-              <a:rPr b="0" lang="it-IT" sz="2000" spc="-1" strike="noStrike">
-                <a:latin typeface="Arial"/>
-              </a:rPr>
-              <a:t>4) spostare </a:t>
-            </a:r>
-            <a:r>
-              <a:rPr b="0" lang="it-IT" sz="2000" spc="-1" strike="noStrike">
-                <a:latin typeface="Arial"/>
-              </a:rPr>
-              <a:t>la forma </a:t>
-            </a:r>
-            <a:r>
-              <a:rPr b="0" lang="it-IT" sz="2000" spc="-1" strike="noStrike">
-                <a:latin typeface="Arial"/>
-              </a:rPr>
-              <a:t>semitraspar</a:t>
-            </a:r>
-            <a:r>
-              <a:rPr b="0" lang="it-IT" sz="2000" spc="-1" strike="noStrike">
-                <a:latin typeface="Arial"/>
-              </a:rPr>
-              <a:t>ente nella </a:t>
-            </a:r>
-            <a:r>
-              <a:rPr b="0" lang="it-IT" sz="2000" spc="-1" strike="noStrike">
-                <a:latin typeface="Arial"/>
-              </a:rPr>
-              <a:t>posizione </a:t>
-            </a:r>
-            <a:r>
-              <a:rPr b="0" lang="it-IT" sz="2000" spc="-1" strike="noStrike">
-                <a:latin typeface="Arial"/>
-              </a:rPr>
-              <a:t>originaria, 5) </a:t>
-            </a:r>
-            <a:r>
-              <a:rPr b="0" lang="it-IT" sz="2000" spc="-1" strike="noStrike">
-                <a:latin typeface="Arial"/>
-              </a:rPr>
-              <a:t>aggiornare il </a:t>
-            </a:r>
-            <a:r>
-              <a:rPr b="0" lang="it-IT" sz="2000" spc="-1" strike="noStrike">
-                <a:latin typeface="Arial"/>
-              </a:rPr>
-              <a:t>testo nella </a:t>
-            </a:r>
-            <a:r>
-              <a:rPr b="0" lang="it-IT" sz="2000" spc="-1" strike="noStrike">
-                <a:latin typeface="Arial"/>
-              </a:rPr>
-              <a:t>diapositiva.</a:t>
+              <a:t>Per usare la diapositiva di animazione del titolo con una nuova immagine è sufficiente 1) spostare di lato la parte superiore della forma semitrasparente, 2) eliminare l'immagine segnaposto, 3) fare clic sull'icona dell'immagine per aggiungere una nuova immagine, 4) spostare la forma semitrasparente nella posizione originaria, 5) aggiornare il testo nella diapositiva.</a:t>
             </a:r>
             <a:endParaRPr b="0" lang="it-IT" sz="2000" spc="-1" strike="noStrike">
               <a:latin typeface="Arial"/>
@@ -2186,7 +1784,7 @@
       </p:sp>
       <p:sp>
         <p:nvSpPr>
-          <p:cNvPr id="146" name="PlaceHolder 3"/>
+          <p:cNvPr id="148" name="PlaceHolder 3"/>
           <p:cNvSpPr>
             <a:spLocks noGrp="1"/>
           </p:cNvSpPr>
@@ -2233,7 +1831,7 @@
               </a:lnSpc>
               <a:buNone/>
             </a:pPr>
-            <a:fld id="{5C90EA4F-B234-4BEA-A977-84DD06ED0D93}" type="slidenum">
+            <a:fld id="{81CCCB28-4E22-47AF-9ADA-85BDC2512091}" type="slidenum">
               <a:rPr b="0" lang="it-IT" sz="1200" spc="-1" strike="noStrike">
                 <a:solidFill>
                   <a:srgbClr val="000000"/>
@@ -2241,7 +1839,7 @@
                 <a:latin typeface="+mn-lt"/>
                 <a:ea typeface="+mn-ea"/>
               </a:rPr>
-              <a:t>5</a:t>
+              <a:t>&lt;numero&gt;</a:t>
             </a:fld>
             <a:endParaRPr b="0" lang="it-IT" sz="1200" spc="-1" strike="noStrike">
               <a:latin typeface="Times New Roman"/>
@@ -2305,7 +1903,7 @@
         <p:txBody>
           <a:bodyPr/>
           <a:p>
-            <a:fld id="{B7380865-A53B-488D-890F-970A720EAE23}" type="slidenum">
+            <a:fld id="{244FA8B4-8C95-413F-B31B-373D7CFA6463}" type="slidenum">
               <a:t>&lt;#&gt;</a:t>
             </a:fld>
           </a:p>
@@ -2493,7 +2091,7 @@
         <p:txBody>
           <a:bodyPr/>
           <a:p>
-            <a:fld id="{CA3F88F7-9AC9-42B4-98AD-6E1352691BA4}" type="slidenum">
+            <a:fld id="{3C74A45E-6DBD-4713-BC9C-A90F9B92CB22}" type="slidenum">
               <a:t>&lt;#&gt;</a:t>
             </a:fld>
           </a:p>
@@ -2749,7 +2347,7 @@
         <p:txBody>
           <a:bodyPr/>
           <a:p>
-            <a:fld id="{43355EE4-7285-4DEA-B762-C452D59C2CA1}" type="slidenum">
+            <a:fld id="{A65229CA-8712-4047-AD15-732C34A3DB32}" type="slidenum">
               <a:t>&lt;#&gt;</a:t>
             </a:fld>
           </a:p>
@@ -3073,7 +2671,7 @@
         <p:txBody>
           <a:bodyPr/>
           <a:p>
-            <a:fld id="{CA02D859-D1BD-4E31-868D-7859899B8E7D}" type="slidenum">
+            <a:fld id="{DCE09AA1-8FE8-475E-AFDD-9D946FF3B019}" type="slidenum">
               <a:t>&lt;#&gt;</a:t>
             </a:fld>
           </a:p>
@@ -3156,7 +2754,7 @@
         <p:txBody>
           <a:bodyPr/>
           <a:p>
-            <a:fld id="{8F8711F0-E275-4048-82FE-DABC776DB48D}" type="slidenum">
+            <a:fld id="{49E04014-4749-4E4B-83DA-3DCE6EE651FF}" type="slidenum">
               <a:t>&lt;#&gt;</a:t>
             </a:fld>
           </a:p>
@@ -3313,7 +2911,7 @@
         <p:txBody>
           <a:bodyPr/>
           <a:p>
-            <a:fld id="{8BECEA8F-5EE8-4590-B0FE-78DB3657F47D}" type="slidenum">
+            <a:fld id="{C5CEA04F-68C8-472F-94D5-E4519C85A546}" type="slidenum">
               <a:t>&lt;#&gt;</a:t>
             </a:fld>
           </a:p>
@@ -3467,7 +3065,7 @@
         <p:txBody>
           <a:bodyPr/>
           <a:p>
-            <a:fld id="{DB0259BF-54BE-42D3-89F5-EB4C802B6497}" type="slidenum">
+            <a:fld id="{A76A484B-D401-4078-90CF-40754E34A32D}" type="slidenum">
               <a:t>&lt;#&gt;</a:t>
             </a:fld>
           </a:p>
@@ -3655,7 +3253,7 @@
         <p:txBody>
           <a:bodyPr/>
           <a:p>
-            <a:fld id="{E33A86B6-76D1-4DF3-9E80-A6301CC702B7}" type="slidenum">
+            <a:fld id="{483A4D76-6EC1-4274-A531-97081363410B}" type="slidenum">
               <a:t>&lt;#&gt;</a:t>
             </a:fld>
           </a:p>
@@ -3775,7 +3373,7 @@
         <p:txBody>
           <a:bodyPr/>
           <a:p>
-            <a:fld id="{BC9EA676-00F9-4662-ADA5-076205F821A0}" type="slidenum">
+            <a:fld id="{5B03A4E7-3E6A-4F4A-8DBA-246B2E80ED89}" type="slidenum">
               <a:t>&lt;#&gt;</a:t>
             </a:fld>
           </a:p>
@@ -3895,7 +3493,7 @@
         <p:txBody>
           <a:bodyPr/>
           <a:p>
-            <a:fld id="{A86F8250-63E9-4747-8879-6D492933589B}" type="slidenum">
+            <a:fld id="{5230B001-0190-483F-BADA-DA32B08E9FEA}" type="slidenum">
               <a:t>&lt;#&gt;</a:t>
             </a:fld>
           </a:p>
@@ -4117,7 +3715,7 @@
         <p:txBody>
           <a:bodyPr/>
           <a:p>
-            <a:fld id="{A91C4974-BA97-40FE-856A-AF80B67700EF}" type="slidenum">
+            <a:fld id="{93C4E630-205A-4C4D-816D-2D9F5EB5ED11}" type="slidenum">
               <a:t>&lt;#&gt;</a:t>
             </a:fld>
           </a:p>
@@ -4274,7 +3872,7 @@
         <p:txBody>
           <a:bodyPr/>
           <a:p>
-            <a:fld id="{E367DC22-3807-4264-9039-7A788D80851A}" type="slidenum">
+            <a:fld id="{75E3385F-3CAE-4BF2-9724-1234B8939C2F}" type="slidenum">
               <a:t>&lt;#&gt;</a:t>
             </a:fld>
           </a:p>
@@ -4496,7 +4094,7 @@
         <p:txBody>
           <a:bodyPr/>
           <a:p>
-            <a:fld id="{AED9BDB3-D4DE-4B11-998C-FF45C22F2348}" type="slidenum">
+            <a:fld id="{16CA4EBE-F7A5-468A-AEB7-66627F44E102}" type="slidenum">
               <a:t>&lt;#&gt;</a:t>
             </a:fld>
           </a:p>
@@ -4718,7 +4316,7 @@
         <p:txBody>
           <a:bodyPr/>
           <a:p>
-            <a:fld id="{67A4D035-519C-4F62-93FB-56FDB9B3743C}" type="slidenum">
+            <a:fld id="{DDCA9EA3-10D3-4AF0-87D9-CDD7162D25C2}" type="slidenum">
               <a:t>&lt;#&gt;</a:t>
             </a:fld>
           </a:p>
@@ -4906,7 +4504,7 @@
         <p:txBody>
           <a:bodyPr/>
           <a:p>
-            <a:fld id="{08CD69CA-7C34-400A-ACEE-42377E4BBCA9}" type="slidenum">
+            <a:fld id="{7D95033C-1F2E-4DA2-94B5-57C5405F363E}" type="slidenum">
               <a:t>&lt;#&gt;</a:t>
             </a:fld>
           </a:p>
@@ -5162,7 +4760,7 @@
         <p:txBody>
           <a:bodyPr/>
           <a:p>
-            <a:fld id="{99F80A09-093D-4DE0-8400-687126643E9B}" type="slidenum">
+            <a:fld id="{A8C15D6E-8444-474C-9B4B-D78672D93E17}" type="slidenum">
               <a:t>&lt;#&gt;</a:t>
             </a:fld>
           </a:p>
@@ -5486,7 +5084,7 @@
         <p:txBody>
           <a:bodyPr/>
           <a:p>
-            <a:fld id="{85EACDA7-E7D3-4FB7-AA67-7D7CA5B8161D}" type="slidenum">
+            <a:fld id="{952A317D-C7BE-40C0-AF9B-3B1862346BD2}" type="slidenum">
               <a:t>&lt;#&gt;</a:t>
             </a:fld>
           </a:p>
@@ -5640,7 +5238,7 @@
         <p:txBody>
           <a:bodyPr/>
           <a:p>
-            <a:fld id="{BE104887-D22D-455F-AA44-789B00B20063}" type="slidenum">
+            <a:fld id="{91E98EC9-B267-4450-A407-FD4EA56F5303}" type="slidenum">
               <a:t>&lt;#&gt;</a:t>
             </a:fld>
           </a:p>
@@ -5828,7 +5426,7 @@
         <p:txBody>
           <a:bodyPr/>
           <a:p>
-            <a:fld id="{ECE7E4A0-2DD2-4E11-B86C-E84B84D0C39A}" type="slidenum">
+            <a:fld id="{1B460930-59C3-404E-8144-D550D8CA26F4}" type="slidenum">
               <a:t>&lt;#&gt;</a:t>
             </a:fld>
           </a:p>
@@ -5948,7 +5546,7 @@
         <p:txBody>
           <a:bodyPr/>
           <a:p>
-            <a:fld id="{CD0EA302-C378-4C90-AB32-6EFD81E620EF}" type="slidenum">
+            <a:fld id="{A0BA1742-B23E-40CF-9F41-7BB857EFCEC4}" type="slidenum">
               <a:t>&lt;#&gt;</a:t>
             </a:fld>
           </a:p>
@@ -6068,7 +5666,7 @@
         <p:txBody>
           <a:bodyPr/>
           <a:p>
-            <a:fld id="{6DA9FD4B-B954-4B22-8063-5DD6AE0E8CA6}" type="slidenum">
+            <a:fld id="{340DBE5E-6D5F-49B0-98B1-518124E3BB58}" type="slidenum">
               <a:t>&lt;#&gt;</a:t>
             </a:fld>
           </a:p>
@@ -6290,7 +5888,7 @@
         <p:txBody>
           <a:bodyPr/>
           <a:p>
-            <a:fld id="{8652BDCE-16C5-461F-A7E4-464AD3707AE9}" type="slidenum">
+            <a:fld id="{108DFEEC-B157-44B8-A498-4283B57A9863}" type="slidenum">
               <a:t>&lt;#&gt;</a:t>
             </a:fld>
           </a:p>
@@ -6512,7 +6110,7 @@
         <p:txBody>
           <a:bodyPr/>
           <a:p>
-            <a:fld id="{17F4DA0B-D2DC-4D20-8963-DB0F2122E1C5}" type="slidenum">
+            <a:fld id="{F770FA00-D1A1-4D76-8E1B-EFA4CB8C7CB5}" type="slidenum">
               <a:t>&lt;#&gt;</a:t>
             </a:fld>
           </a:p>
@@ -6734,7 +6332,7 @@
         <p:txBody>
           <a:bodyPr/>
           <a:p>
-            <a:fld id="{70D4C32A-6F56-475C-A9FF-665385F26A43}" type="slidenum">
+            <a:fld id="{AF704E80-8653-40CC-B7B8-54188A293F76}" type="slidenum">
               <a:t>&lt;#&gt;</a:t>
             </a:fld>
           </a:p>
@@ -6868,25 +6466,7 @@
               <a:rPr b="0" lang="it-IT" sz="1800" spc="-1" strike="noStrike">
                 <a:latin typeface="Arial"/>
               </a:rPr>
-              <a:t>Fai clic per </a:t>
-            </a:r>
-            <a:r>
-              <a:rPr b="0" lang="it-IT" sz="1800" spc="-1" strike="noStrike">
-                <a:latin typeface="Arial"/>
-              </a:rPr>
-              <a:t>modificare il </a:t>
-            </a:r>
-            <a:r>
-              <a:rPr b="0" lang="it-IT" sz="1800" spc="-1" strike="noStrike">
-                <a:latin typeface="Arial"/>
-              </a:rPr>
-              <a:t>formato del </a:t>
-            </a:r>
-            <a:r>
-              <a:rPr b="0" lang="it-IT" sz="1800" spc="-1" strike="noStrike">
-                <a:latin typeface="Arial"/>
-              </a:rPr>
-              <a:t>testo del titolo</a:t>
+              <a:t>Fai clic per modificare il formato del testo del titolo</a:t>
             </a:r>
             <a:endParaRPr b="0" lang="it-IT" sz="1800" spc="-1" strike="noStrike">
               <a:latin typeface="Arial"/>
@@ -6943,7 +6523,7 @@
               <a:rPr b="0" lang="it-IT" sz="1400" spc="-1" strike="noStrike">
                 <a:latin typeface="Liberation Sans Narrow"/>
               </a:rPr>
-              <a:t>&lt;piè di pagina&gt;</a:t>
+              <a:t> </a:t>
             </a:r>
             <a:endParaRPr b="0" lang="it-IT" sz="1400" spc="-1" strike="noStrike">
               <a:latin typeface="Times New Roman"/>
@@ -6996,11 +6576,11 @@
               </a:lnSpc>
               <a:buNone/>
             </a:pPr>
-            <a:fld id="{31D1C63C-552C-4AF0-B2B4-4F357D8C4281}" type="slidenum">
+            <a:fld id="{33C740F9-80F5-4051-ACE9-92B9791648C2}" type="slidenum">
               <a:rPr b="0" lang="it-IT" sz="2600" spc="-1" strike="noStrike">
                 <a:latin typeface="Liberation Sans Narrow"/>
               </a:rPr>
-              <a:t>&lt;numero&gt;</a:t>
+              <a:t>1</a:t>
             </a:fld>
             <a:endParaRPr b="0" lang="it-IT" sz="2600" spc="-1" strike="noStrike">
               <a:latin typeface="Times New Roman"/>
@@ -7047,7 +6627,7 @@
               <a:rPr b="0" lang="it-IT" sz="1400" spc="-1" strike="noStrike">
                 <a:latin typeface="Times New Roman"/>
               </a:rPr>
-              <a:t>&lt;data/ora&gt;</a:t>
+              <a:t> </a:t>
             </a:r>
             <a:endParaRPr b="0" lang="it-IT" sz="1400" spc="-1" strike="noStrike">
               <a:latin typeface="Times New Roman"/>
@@ -7436,7 +7016,7 @@
               </a:lnSpc>
               <a:buNone/>
             </a:pPr>
-            <a:fld id="{15BB9102-EF12-40BD-A676-7AAD325D61DA}" type="slidenum">
+            <a:fld id="{8AB84FBF-F58D-41EC-B085-994DDAC71DB3}" type="slidenum">
               <a:rPr b="0" lang="it-IT" sz="2600" spc="-1" strike="noStrike">
                 <a:latin typeface="Liberation Sans Narrow"/>
               </a:rPr>
@@ -8304,88 +7884,7 @@
       </p:sp>
       <p:sp>
         <p:nvSpPr>
-          <p:cNvPr id="99" name="CasellaDiTesto 5"/>
-          <p:cNvSpPr/>
-          <p:nvPr/>
-        </p:nvSpPr>
-        <p:spPr>
-          <a:xfrm>
-            <a:off x="540000" y="3301560"/>
-            <a:ext cx="10941480" cy="1919160"/>
-          </a:xfrm>
-          <a:prstGeom prst="rect">
-            <a:avLst/>
-          </a:prstGeom>
-          <a:noFill/>
-          <a:ln w="0">
-            <a:noFill/>
-          </a:ln>
-        </p:spPr>
-        <p:style>
-          <a:lnRef idx="0"/>
-          <a:fillRef idx="0"/>
-          <a:effectRef idx="0"/>
-          <a:fontRef idx="minor"/>
-        </p:style>
-        <p:txBody>
-          <a:bodyPr lIns="90000" rIns="90000" tIns="45000" bIns="45000" anchor="t">
-            <a:spAutoFit/>
-          </a:bodyPr>
-          <a:p>
-            <a:pPr marL="285840" indent="-285840">
-              <a:lnSpc>
-                <a:spcPct val="100000"/>
-              </a:lnSpc>
-              <a:buClr>
-                <a:srgbClr val="ffffff"/>
-              </a:buClr>
-              <a:buFont typeface="Courier New"/>
-              <a:buChar char="o"/>
-            </a:pPr>
-            <a:r>
-              <a:rPr b="0" lang="it-IT" sz="2400" spc="-1" strike="noStrike">
-                <a:solidFill>
-                  <a:srgbClr val="5b277d"/>
-                </a:solidFill>
-                <a:latin typeface="Calibri"/>
-                <a:ea typeface="DejaVu Sans"/>
-              </a:rPr>
-              <a:t>Si vuole implementare un intrusion response system, ovvero un sistema che in caso di attacco, da parte di uno o più attaccanti, sia in grado di intraprendere delle azioni a salvaguardia del sistema attaccato.</a:t>
-            </a:r>
-            <a:endParaRPr b="0" lang="it-IT" sz="2400" spc="-1" strike="noStrike">
-              <a:latin typeface="Arial"/>
-            </a:endParaRPr>
-          </a:p>
-          <a:p>
-            <a:pPr marL="285840" indent="-285840">
-              <a:lnSpc>
-                <a:spcPct val="100000"/>
-              </a:lnSpc>
-              <a:buClr>
-                <a:srgbClr val="ffffff"/>
-              </a:buClr>
-              <a:buFont typeface="Courier New"/>
-              <a:buChar char="o"/>
-            </a:pPr>
-            <a:r>
-              <a:rPr b="0" lang="it-IT" sz="2400" spc="-1" strike="noStrike">
-                <a:solidFill>
-                  <a:srgbClr val="5b277d"/>
-                </a:solidFill>
-                <a:latin typeface="Calibri"/>
-                <a:ea typeface="DejaVu Sans"/>
-              </a:rPr>
-              <a:t>Il tutto è rappresentabile mediante un gioco stocastico.</a:t>
-            </a:r>
-            <a:endParaRPr b="0" lang="it-IT" sz="2400" spc="-1" strike="noStrike">
-              <a:latin typeface="Arial"/>
-            </a:endParaRPr>
-          </a:p>
-        </p:txBody>
-      </p:sp>
-      <p:sp>
-        <p:nvSpPr>
-          <p:cNvPr id="100" name="Segnaposto testo 1"/>
+          <p:cNvPr id="99" name="Segnaposto testo 1"/>
           <p:cNvSpPr/>
           <p:nvPr/>
         </p:nvSpPr>
@@ -8443,7 +7942,7 @@
       </p:sp>
       <p:pic>
         <p:nvPicPr>
-          <p:cNvPr id="101" name="" descr=""/>
+          <p:cNvPr id="100" name="" descr=""/>
           <p:cNvPicPr/>
           <p:nvPr/>
         </p:nvPicPr>
@@ -8466,7 +7965,7 @@
       </p:pic>
       <p:sp>
         <p:nvSpPr>
-          <p:cNvPr id="102" name="PlaceHolder 5"/>
+          <p:cNvPr id="101" name="PlaceHolder 5"/>
           <p:cNvSpPr txBox="1"/>
           <p:nvPr/>
         </p:nvSpPr>
@@ -8513,11 +8012,8 @@
                 </a:solidFill>
                 <a:latin typeface="Calibri"/>
               </a:rPr>
-              <a:t>Obiettivo </a:t>
-            </a:r>
-            <a:br>
-              <a:rPr sz="4000"/>
-            </a:br>
+              <a:t>Obiet</a:t>
+            </a:r>
             <a:r>
               <a:rPr b="1" lang="it-IT" sz="4000" spc="94" strike="noStrike">
                 <a:solidFill>
@@ -8525,7 +8021,28 @@
                 </a:solidFill>
                 <a:latin typeface="Calibri"/>
               </a:rPr>
-              <a:t>generale</a:t>
+              <a:t>tivo </a:t>
+            </a:r>
+            <a:br>
+              <a:rPr sz="4000"/>
+            </a:br>
+            <a:r>
+              <a:rPr b="1" lang="it-IT" sz="4000" spc="94" strike="noStrike">
+                <a:solidFill>
+                  <a:srgbClr val="5b277d"/>
+                </a:solidFill>
+                <a:latin typeface="Calibri"/>
+              </a:rPr>
+              <a:t>gene</a:t>
+            </a:r>
+            <a:r>
+              <a:rPr b="1" lang="it-IT" sz="4000" spc="94" strike="noStrike">
+                <a:solidFill>
+                  <a:srgbClr val="5b277d"/>
+                </a:solidFill>
+                <a:latin typeface="Calibri"/>
+              </a:rPr>
+              <a:t>rale</a:t>
             </a:r>
             <a:endParaRPr b="0" lang="it-IT" sz="4000" spc="-1" strike="noStrike">
               <a:latin typeface="Arial"/>
@@ -8535,7 +8052,7 @@
       </p:sp>
       <p:pic>
         <p:nvPicPr>
-          <p:cNvPr id="103" name="" descr=""/>
+          <p:cNvPr id="102" name="" descr=""/>
           <p:cNvPicPr/>
           <p:nvPr/>
         </p:nvPicPr>
@@ -8556,6 +8073,511 @@
           </a:ln>
         </p:spPr>
       </p:pic>
+      <p:sp>
+        <p:nvSpPr>
+          <p:cNvPr id="103" name=""/>
+          <p:cNvSpPr/>
+          <p:nvPr/>
+        </p:nvSpPr>
+        <p:spPr>
+          <a:xfrm>
+            <a:off x="750600" y="3204000"/>
+            <a:ext cx="10661400" cy="2590560"/>
+          </a:xfrm>
+          <a:custGeom>
+            <a:avLst/>
+            <a:gdLst/>
+            <a:ahLst/>
+            <a:rect l="l" t="t" r="r" b="b"/>
+            <a:pathLst>
+              <a:path w="21600" h="23261">
+                <a:moveTo>
+                  <a:pt x="3600" y="0"/>
+                </a:moveTo>
+                <a:arcTo wR="3600" hR="3600" stAng="16200000" swAng="-5400000"/>
+                <a:lnTo>
+                  <a:pt x="0" y="19661"/>
+                </a:lnTo>
+                <a:arcTo wR="3600" hR="1939" stAng="10800000" swAng="-5400000"/>
+                <a:lnTo>
+                  <a:pt x="18000" y="21600"/>
+                </a:lnTo>
+                <a:arcTo wR="3600" hR="1939" stAng="5400000" swAng="-5400000"/>
+                <a:lnTo>
+                  <a:pt x="21600" y="3600"/>
+                </a:lnTo>
+                <a:arcTo wR="3600" hR="3600" stAng="0" swAng="-5400000"/>
+                <a:close/>
+              </a:path>
+            </a:pathLst>
+          </a:custGeom>
+          <a:solidFill>
+            <a:srgbClr val="ffffd7"/>
+          </a:solidFill>
+          <a:ln w="0">
+            <a:solidFill>
+              <a:srgbClr val="3465a4"/>
+            </a:solidFill>
+          </a:ln>
+        </p:spPr>
+        <p:style>
+          <a:lnRef idx="0"/>
+          <a:fillRef idx="0"/>
+          <a:effectRef idx="0"/>
+          <a:fontRef idx="minor"/>
+        </p:style>
+      </p:sp>
+      <p:sp>
+        <p:nvSpPr>
+          <p:cNvPr id="104" name="CasellaDiTesto 5"/>
+          <p:cNvSpPr/>
+          <p:nvPr/>
+        </p:nvSpPr>
+        <p:spPr>
+          <a:xfrm>
+            <a:off x="720000" y="3420000"/>
+            <a:ext cx="10941480" cy="1919160"/>
+          </a:xfrm>
+          <a:prstGeom prst="rect">
+            <a:avLst/>
+          </a:prstGeom>
+          <a:noFill/>
+          <a:ln w="0">
+            <a:noFill/>
+          </a:ln>
+        </p:spPr>
+        <p:style>
+          <a:lnRef idx="0"/>
+          <a:fillRef idx="0"/>
+          <a:effectRef idx="0"/>
+          <a:fontRef idx="minor"/>
+        </p:style>
+        <p:txBody>
+          <a:bodyPr lIns="90000" rIns="90000" tIns="45000" bIns="45000" anchor="t">
+            <a:spAutoFit/>
+          </a:bodyPr>
+          <a:p>
+            <a:pPr marL="285840" indent="-285840">
+              <a:lnSpc>
+                <a:spcPct val="100000"/>
+              </a:lnSpc>
+              <a:buClr>
+                <a:srgbClr val="ffffff"/>
+              </a:buClr>
+              <a:buFont typeface="Courier New"/>
+              <a:buChar char="o"/>
+            </a:pPr>
+            <a:r>
+              <a:rPr b="0" lang="it-IT" sz="2400" spc="-1" strike="noStrike">
+                <a:solidFill>
+                  <a:srgbClr val="5b277d"/>
+                </a:solidFill>
+                <a:latin typeface="Calibri"/>
+                <a:ea typeface="DejaVu Sans"/>
+              </a:rPr>
+              <a:t>Si vuole </a:t>
+            </a:r>
+            <a:r>
+              <a:rPr b="0" lang="it-IT" sz="2400" spc="-1" strike="noStrike">
+                <a:solidFill>
+                  <a:srgbClr val="5b277d"/>
+                </a:solidFill>
+                <a:latin typeface="Calibri"/>
+                <a:ea typeface="DejaVu Sans"/>
+              </a:rPr>
+              <a:t>impleme</a:t>
+            </a:r>
+            <a:r>
+              <a:rPr b="0" lang="it-IT" sz="2400" spc="-1" strike="noStrike">
+                <a:solidFill>
+                  <a:srgbClr val="5b277d"/>
+                </a:solidFill>
+                <a:latin typeface="Calibri"/>
+                <a:ea typeface="DejaVu Sans"/>
+              </a:rPr>
+              <a:t>ntare un </a:t>
+            </a:r>
+            <a:r>
+              <a:rPr b="0" lang="it-IT" sz="2400" spc="-1" strike="noStrike">
+                <a:solidFill>
+                  <a:srgbClr val="5b277d"/>
+                </a:solidFill>
+                <a:latin typeface="Calibri"/>
+                <a:ea typeface="DejaVu Sans"/>
+              </a:rPr>
+              <a:t>intrusion </a:t>
+            </a:r>
+            <a:r>
+              <a:rPr b="0" lang="it-IT" sz="2400" spc="-1" strike="noStrike">
+                <a:solidFill>
+                  <a:srgbClr val="5b277d"/>
+                </a:solidFill>
+                <a:latin typeface="Calibri"/>
+                <a:ea typeface="DejaVu Sans"/>
+              </a:rPr>
+              <a:t>respons</a:t>
+            </a:r>
+            <a:r>
+              <a:rPr b="0" lang="it-IT" sz="2400" spc="-1" strike="noStrike">
+                <a:solidFill>
+                  <a:srgbClr val="5b277d"/>
+                </a:solidFill>
+                <a:latin typeface="Calibri"/>
+                <a:ea typeface="DejaVu Sans"/>
+              </a:rPr>
+              <a:t>e </a:t>
+            </a:r>
+            <a:r>
+              <a:rPr b="0" lang="it-IT" sz="2400" spc="-1" strike="noStrike">
+                <a:solidFill>
+                  <a:srgbClr val="5b277d"/>
+                </a:solidFill>
+                <a:latin typeface="Calibri"/>
+                <a:ea typeface="DejaVu Sans"/>
+              </a:rPr>
+              <a:t>system, </a:t>
+            </a:r>
+            <a:r>
+              <a:rPr b="0" lang="it-IT" sz="2400" spc="-1" strike="noStrike">
+                <a:solidFill>
+                  <a:srgbClr val="5b277d"/>
+                </a:solidFill>
+                <a:latin typeface="Calibri"/>
+                <a:ea typeface="DejaVu Sans"/>
+              </a:rPr>
+              <a:t>ovvero </a:t>
+            </a:r>
+            <a:r>
+              <a:rPr b="0" lang="it-IT" sz="2400" spc="-1" strike="noStrike">
+                <a:solidFill>
+                  <a:srgbClr val="5b277d"/>
+                </a:solidFill>
+                <a:latin typeface="Calibri"/>
+                <a:ea typeface="DejaVu Sans"/>
+              </a:rPr>
+              <a:t>un </a:t>
+            </a:r>
+            <a:r>
+              <a:rPr b="0" lang="it-IT" sz="2400" spc="-1" strike="noStrike">
+                <a:solidFill>
+                  <a:srgbClr val="5b277d"/>
+                </a:solidFill>
+                <a:latin typeface="Calibri"/>
+                <a:ea typeface="DejaVu Sans"/>
+              </a:rPr>
+              <a:t>sistema </a:t>
+            </a:r>
+            <a:r>
+              <a:rPr b="0" lang="it-IT" sz="2400" spc="-1" strike="noStrike">
+                <a:solidFill>
+                  <a:srgbClr val="5b277d"/>
+                </a:solidFill>
+                <a:latin typeface="Calibri"/>
+                <a:ea typeface="DejaVu Sans"/>
+              </a:rPr>
+              <a:t>che in </a:t>
+            </a:r>
+            <a:r>
+              <a:rPr b="0" lang="it-IT" sz="2400" spc="-1" strike="noStrike">
+                <a:solidFill>
+                  <a:srgbClr val="5b277d"/>
+                </a:solidFill>
+                <a:latin typeface="Calibri"/>
+                <a:ea typeface="DejaVu Sans"/>
+              </a:rPr>
+              <a:t>caso di </a:t>
+            </a:r>
+            <a:r>
+              <a:rPr b="0" lang="it-IT" sz="2400" spc="-1" strike="noStrike">
+                <a:solidFill>
+                  <a:srgbClr val="5b277d"/>
+                </a:solidFill>
+                <a:latin typeface="Calibri"/>
+                <a:ea typeface="DejaVu Sans"/>
+              </a:rPr>
+              <a:t>attacco, </a:t>
+            </a:r>
+            <a:r>
+              <a:rPr b="0" lang="it-IT" sz="2400" spc="-1" strike="noStrike">
+                <a:solidFill>
+                  <a:srgbClr val="5b277d"/>
+                </a:solidFill>
+                <a:latin typeface="Calibri"/>
+                <a:ea typeface="DejaVu Sans"/>
+              </a:rPr>
+              <a:t>da parte </a:t>
+            </a:r>
+            <a:r>
+              <a:rPr b="0" lang="it-IT" sz="2400" spc="-1" strike="noStrike">
+                <a:solidFill>
+                  <a:srgbClr val="5b277d"/>
+                </a:solidFill>
+                <a:latin typeface="Calibri"/>
+                <a:ea typeface="DejaVu Sans"/>
+              </a:rPr>
+              <a:t>di uno o </a:t>
+            </a:r>
+            <a:r>
+              <a:rPr b="0" lang="it-IT" sz="2400" spc="-1" strike="noStrike">
+                <a:solidFill>
+                  <a:srgbClr val="5b277d"/>
+                </a:solidFill>
+                <a:latin typeface="Calibri"/>
+                <a:ea typeface="DejaVu Sans"/>
+              </a:rPr>
+              <a:t>più </a:t>
+            </a:r>
+            <a:r>
+              <a:rPr b="0" lang="it-IT" sz="2400" spc="-1" strike="noStrike">
+                <a:solidFill>
+                  <a:srgbClr val="5b277d"/>
+                </a:solidFill>
+                <a:latin typeface="Calibri"/>
+                <a:ea typeface="DejaVu Sans"/>
+              </a:rPr>
+              <a:t>attaccan</a:t>
+            </a:r>
+            <a:r>
+              <a:rPr b="0" lang="it-IT" sz="2400" spc="-1" strike="noStrike">
+                <a:solidFill>
+                  <a:srgbClr val="5b277d"/>
+                </a:solidFill>
+                <a:latin typeface="Calibri"/>
+                <a:ea typeface="DejaVu Sans"/>
+              </a:rPr>
+              <a:t>ti, sia in </a:t>
+            </a:r>
+            <a:r>
+              <a:rPr b="0" lang="it-IT" sz="2400" spc="-1" strike="noStrike">
+                <a:solidFill>
+                  <a:srgbClr val="5b277d"/>
+                </a:solidFill>
+                <a:latin typeface="Calibri"/>
+                <a:ea typeface="DejaVu Sans"/>
+              </a:rPr>
+              <a:t>grado di </a:t>
+            </a:r>
+            <a:r>
+              <a:rPr b="0" lang="it-IT" sz="2400" spc="-1" strike="noStrike">
+                <a:solidFill>
+                  <a:srgbClr val="5b277d"/>
+                </a:solidFill>
+                <a:latin typeface="Calibri"/>
+                <a:ea typeface="DejaVu Sans"/>
+              </a:rPr>
+              <a:t>intrapre</a:t>
+            </a:r>
+            <a:r>
+              <a:rPr b="0" lang="it-IT" sz="2400" spc="-1" strike="noStrike">
+                <a:solidFill>
+                  <a:srgbClr val="5b277d"/>
+                </a:solidFill>
+                <a:latin typeface="Calibri"/>
+                <a:ea typeface="DejaVu Sans"/>
+              </a:rPr>
+              <a:t>ndere </a:t>
+            </a:r>
+            <a:r>
+              <a:rPr b="0" lang="it-IT" sz="2400" spc="-1" strike="noStrike">
+                <a:solidFill>
+                  <a:srgbClr val="5b277d"/>
+                </a:solidFill>
+                <a:latin typeface="Calibri"/>
+                <a:ea typeface="DejaVu Sans"/>
+              </a:rPr>
+              <a:t>delle </a:t>
+            </a:r>
+            <a:r>
+              <a:rPr b="0" lang="it-IT" sz="2400" spc="-1" strike="noStrike">
+                <a:solidFill>
+                  <a:srgbClr val="5b277d"/>
+                </a:solidFill>
+                <a:latin typeface="Calibri"/>
+                <a:ea typeface="DejaVu Sans"/>
+              </a:rPr>
+              <a:t>azioni a </a:t>
+            </a:r>
+            <a:r>
+              <a:rPr b="0" lang="it-IT" sz="2400" spc="-1" strike="noStrike">
+                <a:solidFill>
+                  <a:srgbClr val="5b277d"/>
+                </a:solidFill>
+                <a:latin typeface="Calibri"/>
+                <a:ea typeface="DejaVu Sans"/>
+              </a:rPr>
+              <a:t>salvagua</a:t>
+            </a:r>
+            <a:r>
+              <a:rPr b="0" lang="it-IT" sz="2400" spc="-1" strike="noStrike">
+                <a:solidFill>
+                  <a:srgbClr val="5b277d"/>
+                </a:solidFill>
+                <a:latin typeface="Calibri"/>
+                <a:ea typeface="DejaVu Sans"/>
+              </a:rPr>
+              <a:t>rdia del </a:t>
+            </a:r>
+            <a:r>
+              <a:rPr b="0" lang="it-IT" sz="2400" spc="-1" strike="noStrike">
+                <a:solidFill>
+                  <a:srgbClr val="5b277d"/>
+                </a:solidFill>
+                <a:latin typeface="Calibri"/>
+                <a:ea typeface="DejaVu Sans"/>
+              </a:rPr>
+              <a:t>sistema </a:t>
+            </a:r>
+            <a:r>
+              <a:rPr b="0" lang="it-IT" sz="2400" spc="-1" strike="noStrike">
+                <a:solidFill>
+                  <a:srgbClr val="5b277d"/>
+                </a:solidFill>
+                <a:latin typeface="Calibri"/>
+                <a:ea typeface="DejaVu Sans"/>
+              </a:rPr>
+              <a:t>attaccat</a:t>
+            </a:r>
+            <a:r>
+              <a:rPr b="0" lang="it-IT" sz="2400" spc="-1" strike="noStrike">
+                <a:solidFill>
+                  <a:srgbClr val="5b277d"/>
+                </a:solidFill>
+                <a:latin typeface="Calibri"/>
+                <a:ea typeface="DejaVu Sans"/>
+              </a:rPr>
+              <a:t>o in </a:t>
+            </a:r>
+            <a:r>
+              <a:rPr b="0" lang="it-IT" sz="2400" spc="-1" strike="noStrike">
+                <a:solidFill>
+                  <a:srgbClr val="5b277d"/>
+                </a:solidFill>
+                <a:latin typeface="Calibri"/>
+                <a:ea typeface="DejaVu Sans"/>
+              </a:rPr>
+              <a:t>maniera </a:t>
+            </a:r>
+            <a:r>
+              <a:rPr b="0" lang="it-IT" sz="2400" spc="-1" strike="noStrike">
+                <a:solidFill>
+                  <a:srgbClr val="5b277d"/>
+                </a:solidFill>
+                <a:latin typeface="Calibri"/>
+                <a:ea typeface="DejaVu Sans"/>
+              </a:rPr>
+              <a:t>automat</a:t>
+            </a:r>
+            <a:r>
+              <a:rPr b="0" lang="it-IT" sz="2400" spc="-1" strike="noStrike">
+                <a:solidFill>
+                  <a:srgbClr val="5b277d"/>
+                </a:solidFill>
+                <a:latin typeface="Calibri"/>
+                <a:ea typeface="DejaVu Sans"/>
+              </a:rPr>
+              <a:t>ica.</a:t>
+            </a:r>
+            <a:endParaRPr b="0" lang="it-IT" sz="2400" spc="-1" strike="noStrike">
+              <a:latin typeface="Arial"/>
+            </a:endParaRPr>
+          </a:p>
+          <a:p>
+            <a:pPr marL="285840" indent="-285840">
+              <a:lnSpc>
+                <a:spcPct val="100000"/>
+              </a:lnSpc>
+              <a:buClr>
+                <a:srgbClr val="ffffff"/>
+              </a:buClr>
+              <a:buFont typeface="Courier New"/>
+              <a:buChar char="o"/>
+            </a:pPr>
+            <a:r>
+              <a:rPr b="0" lang="it-IT" sz="2400" spc="-1" strike="noStrike">
+                <a:solidFill>
+                  <a:srgbClr val="5b277d"/>
+                </a:solidFill>
+                <a:latin typeface="Calibri"/>
+                <a:ea typeface="DejaVu Sans"/>
+              </a:rPr>
+              <a:t>Il tutto è </a:t>
+            </a:r>
+            <a:r>
+              <a:rPr b="0" lang="it-IT" sz="2400" spc="-1" strike="noStrike">
+                <a:solidFill>
+                  <a:srgbClr val="5b277d"/>
+                </a:solidFill>
+                <a:latin typeface="Calibri"/>
+                <a:ea typeface="DejaVu Sans"/>
+              </a:rPr>
+              <a:t>rapprese</a:t>
+            </a:r>
+            <a:r>
+              <a:rPr b="0" lang="it-IT" sz="2400" spc="-1" strike="noStrike">
+                <a:solidFill>
+                  <a:srgbClr val="5b277d"/>
+                </a:solidFill>
+                <a:latin typeface="Calibri"/>
+                <a:ea typeface="DejaVu Sans"/>
+              </a:rPr>
+              <a:t>ntabile </a:t>
+            </a:r>
+            <a:r>
+              <a:rPr b="0" lang="it-IT" sz="2400" spc="-1" strike="noStrike">
+                <a:solidFill>
+                  <a:srgbClr val="5b277d"/>
+                </a:solidFill>
+                <a:latin typeface="Calibri"/>
+                <a:ea typeface="DejaVu Sans"/>
+              </a:rPr>
+              <a:t>mediant</a:t>
+            </a:r>
+            <a:r>
+              <a:rPr b="0" lang="it-IT" sz="2400" spc="-1" strike="noStrike">
+                <a:solidFill>
+                  <a:srgbClr val="5b277d"/>
+                </a:solidFill>
+                <a:latin typeface="Calibri"/>
+                <a:ea typeface="DejaVu Sans"/>
+              </a:rPr>
+              <a:t>e un </a:t>
+            </a:r>
+            <a:r>
+              <a:rPr b="0" lang="it-IT" sz="2400" spc="-1" strike="noStrike">
+                <a:solidFill>
+                  <a:srgbClr val="5b277d"/>
+                </a:solidFill>
+                <a:latin typeface="Calibri"/>
+                <a:ea typeface="DejaVu Sans"/>
+              </a:rPr>
+              <a:t>gioco </a:t>
+            </a:r>
+            <a:r>
+              <a:rPr b="0" lang="it-IT" sz="2400" spc="-1" strike="noStrike">
+                <a:solidFill>
+                  <a:srgbClr val="5b277d"/>
+                </a:solidFill>
+                <a:latin typeface="Calibri"/>
+                <a:ea typeface="DejaVu Sans"/>
+              </a:rPr>
+              <a:t>stocastic</a:t>
+            </a:r>
+            <a:r>
+              <a:rPr b="0" lang="it-IT" sz="2400" spc="-1" strike="noStrike">
+                <a:solidFill>
+                  <a:srgbClr val="5b277d"/>
+                </a:solidFill>
+                <a:latin typeface="Calibri"/>
+                <a:ea typeface="DejaVu Sans"/>
+              </a:rPr>
+              <a:t>o.</a:t>
+            </a:r>
+            <a:endParaRPr b="0" lang="it-IT" sz="2400" spc="-1" strike="noStrike">
+              <a:latin typeface="Arial"/>
+            </a:endParaRPr>
+          </a:p>
+        </p:txBody>
+      </p:sp>
     </p:spTree>
   </p:cSld>
   <mc:AlternateContent>
@@ -8588,7 +8610,7 @@
       </p:grpSpPr>
       <p:sp>
         <p:nvSpPr>
-          <p:cNvPr id="104" name="Titolo 4"/>
+          <p:cNvPr id="105" name="Titolo 4"/>
           <p:cNvSpPr/>
           <p:nvPr/>
         </p:nvSpPr>
@@ -8614,7 +8636,7 @@
       </p:sp>
       <p:sp>
         <p:nvSpPr>
-          <p:cNvPr id="105" name="PlaceHolder 1"/>
+          <p:cNvPr id="106" name="PlaceHolder 1"/>
           <p:cNvSpPr>
             <a:spLocks noGrp="1"/>
           </p:cNvSpPr>
@@ -8690,7 +8712,7 @@
       </p:sp>
       <p:sp>
         <p:nvSpPr>
-          <p:cNvPr id="106" name="Segnaposto testo 4"/>
+          <p:cNvPr id="107" name="Segnaposto testo 4"/>
           <p:cNvSpPr/>
           <p:nvPr/>
         </p:nvSpPr>
@@ -8748,7 +8770,7 @@
       </p:sp>
       <p:pic>
         <p:nvPicPr>
-          <p:cNvPr id="107" name="" descr=""/>
+          <p:cNvPr id="108" name="" descr=""/>
           <p:cNvPicPr/>
           <p:nvPr/>
         </p:nvPicPr>
@@ -8771,7 +8793,7 @@
       </p:pic>
       <p:graphicFrame>
         <p:nvGraphicFramePr>
-          <p:cNvPr id="108" name=""/>
+          <p:cNvPr id="109" name=""/>
           <p:cNvGraphicFramePr/>
           <p:nvPr/>
         </p:nvGraphicFramePr>
@@ -9409,7 +9431,7 @@
                         <a:rPr b="0" lang="it-IT" sz="1800" spc="-1" strike="noStrike">
                           <a:latin typeface="Arial"/>
                         </a:rPr>
-                        <a:t>su più nodi paralleli per la generazione e la selezione dei dati pesati per rilevanza, per il training, inseriti nel buffer. (+ stabilità, + convergenza)</a:t>
+                        <a:t>su più nodi paralleli la generazione e la selezione dei dati pesati per rilevanza, per il training, inseriti nel buffer. (+ stabilità, + convergenza)</a:t>
                       </a:r>
                       <a:endParaRPr b="0" lang="it-IT" sz="1800" spc="-1" strike="noStrike">
                         <a:latin typeface="Arial"/>
@@ -9771,7 +9793,7 @@
       </p:grpSpPr>
       <p:sp>
         <p:nvSpPr>
-          <p:cNvPr id="109" name="PlaceHolder 1"/>
+          <p:cNvPr id="110" name="PlaceHolder 1"/>
           <p:cNvSpPr>
             <a:spLocks noGrp="1"/>
           </p:cNvSpPr>
@@ -9832,7 +9854,7 @@
       </p:sp>
       <p:sp>
         <p:nvSpPr>
-          <p:cNvPr id="110" name="Segnaposto testo 5"/>
+          <p:cNvPr id="111" name="Segnaposto testo 5"/>
           <p:cNvSpPr/>
           <p:nvPr/>
         </p:nvSpPr>
@@ -9890,7 +9912,7 @@
       </p:sp>
       <p:sp>
         <p:nvSpPr>
-          <p:cNvPr id="111" name="left-point-arrow 1"/>
+          <p:cNvPr id="112" name="left-point-arrow 1"/>
           <p:cNvSpPr/>
           <p:nvPr/>
         </p:nvSpPr>
@@ -9955,7 +9977,7 @@
       </p:sp>
       <p:sp>
         <p:nvSpPr>
-          <p:cNvPr id="112" name="left-point-arrow 2"/>
+          <p:cNvPr id="113" name="left-point-arrow 2"/>
           <p:cNvSpPr/>
           <p:nvPr/>
         </p:nvSpPr>
@@ -10020,7 +10042,7 @@
       </p:sp>
       <p:sp>
         <p:nvSpPr>
-          <p:cNvPr id="113" name="left-point-arrow 3"/>
+          <p:cNvPr id="114" name="left-point-arrow 3"/>
           <p:cNvSpPr/>
           <p:nvPr/>
         </p:nvSpPr>
@@ -10085,13 +10107,13 @@
       </p:sp>
       <p:sp>
         <p:nvSpPr>
-          <p:cNvPr id="114" name="left-point-arrow 4"/>
+          <p:cNvPr id="115" name="left-point-arrow 4"/>
           <p:cNvSpPr/>
           <p:nvPr/>
         </p:nvSpPr>
         <p:spPr>
           <a:xfrm>
-            <a:off x="10169640" y="2268000"/>
+            <a:off x="10673640" y="2196000"/>
             <a:ext cx="539640" cy="1079640"/>
           </a:xfrm>
           <a:custGeom>
@@ -10150,7 +10172,7 @@
       </p:sp>
       <p:sp>
         <p:nvSpPr>
-          <p:cNvPr id="115" name=""/>
+          <p:cNvPr id="116" name=""/>
           <p:cNvSpPr/>
           <p:nvPr/>
         </p:nvSpPr>
@@ -10187,7 +10209,7 @@
             </a:pathLst>
           </a:custGeom>
           <a:solidFill>
-            <a:srgbClr val="729fcf"/>
+            <a:srgbClr val="ffffd7"/>
           </a:solidFill>
           <a:ln w="0">
             <a:solidFill>
@@ -10204,7 +10226,7 @@
       </p:sp>
       <p:sp>
         <p:nvSpPr>
-          <p:cNvPr id="116" name="CasellaDiTesto 4"/>
+          <p:cNvPr id="117" name="CasellaDiTesto 4"/>
           <p:cNvSpPr/>
           <p:nvPr/>
         </p:nvSpPr>
@@ -10260,7 +10282,7 @@
       </p:sp>
       <p:sp>
         <p:nvSpPr>
-          <p:cNvPr id="117" name=""/>
+          <p:cNvPr id="118" name=""/>
           <p:cNvSpPr/>
           <p:nvPr/>
         </p:nvSpPr>
@@ -10297,7 +10319,7 @@
             </a:pathLst>
           </a:custGeom>
           <a:solidFill>
-            <a:srgbClr val="729fcf"/>
+            <a:srgbClr val="ffffd7"/>
           </a:solidFill>
           <a:ln w="0">
             <a:solidFill>
@@ -10314,7 +10336,7 @@
       </p:sp>
       <p:sp>
         <p:nvSpPr>
-          <p:cNvPr id="118" name="CasellaDiTesto 3"/>
+          <p:cNvPr id="119" name="CasellaDiTesto 3"/>
           <p:cNvSpPr/>
           <p:nvPr/>
         </p:nvSpPr>
@@ -10370,7 +10392,7 @@
       </p:sp>
       <p:sp>
         <p:nvSpPr>
-          <p:cNvPr id="119" name=""/>
+          <p:cNvPr id="120" name=""/>
           <p:cNvSpPr/>
           <p:nvPr/>
         </p:nvSpPr>
@@ -10407,7 +10429,7 @@
             </a:pathLst>
           </a:custGeom>
           <a:solidFill>
-            <a:srgbClr val="729fcf"/>
+            <a:srgbClr val="ffffd7"/>
           </a:solidFill>
           <a:ln w="0">
             <a:solidFill>
@@ -10424,14 +10446,14 @@
       </p:sp>
       <p:sp>
         <p:nvSpPr>
-          <p:cNvPr id="120" name="CasellaDiTesto 1"/>
+          <p:cNvPr id="121" name="CasellaDiTesto 1"/>
           <p:cNvSpPr/>
           <p:nvPr/>
         </p:nvSpPr>
         <p:spPr>
           <a:xfrm>
-            <a:off x="-97200" y="3286800"/>
-            <a:ext cx="2159640" cy="1553400"/>
+            <a:off x="-145800" y="3286800"/>
+            <a:ext cx="2232000" cy="1187640"/>
           </a:xfrm>
           <a:prstGeom prst="rect">
             <a:avLst/>
@@ -10480,7 +10502,7 @@
       </p:sp>
       <p:sp>
         <p:nvSpPr>
-          <p:cNvPr id="121" name=""/>
+          <p:cNvPr id="122" name=""/>
           <p:cNvSpPr/>
           <p:nvPr/>
         </p:nvSpPr>
@@ -10517,7 +10539,7 @@
             </a:pathLst>
           </a:custGeom>
           <a:solidFill>
-            <a:srgbClr val="729fcf"/>
+            <a:srgbClr val="ffffd7"/>
           </a:solidFill>
           <a:ln w="0">
             <a:solidFill>
@@ -10534,7 +10556,7 @@
       </p:sp>
       <p:sp>
         <p:nvSpPr>
-          <p:cNvPr id="122" name="CasellaDiTesto 7"/>
+          <p:cNvPr id="123" name="CasellaDiTesto 7"/>
           <p:cNvSpPr/>
           <p:nvPr/>
         </p:nvSpPr>
@@ -10590,7 +10612,7 @@
       </p:sp>
       <p:sp>
         <p:nvSpPr>
-          <p:cNvPr id="123" name=""/>
+          <p:cNvPr id="124" name=""/>
           <p:cNvSpPr/>
           <p:nvPr/>
         </p:nvSpPr>
@@ -10627,7 +10649,7 @@
             </a:pathLst>
           </a:custGeom>
           <a:solidFill>
-            <a:srgbClr val="729fcf"/>
+            <a:srgbClr val="ffffd7"/>
           </a:solidFill>
           <a:ln w="0">
             <a:solidFill>
@@ -10644,7 +10666,7 @@
       </p:sp>
       <p:sp>
         <p:nvSpPr>
-          <p:cNvPr id="124" name="CasellaDiTesto 6"/>
+          <p:cNvPr id="125" name="CasellaDiTesto 6"/>
           <p:cNvSpPr/>
           <p:nvPr/>
         </p:nvSpPr>
@@ -10700,7 +10722,7 @@
       </p:sp>
       <p:pic>
         <p:nvPicPr>
-          <p:cNvPr id="125" name="" descr=""/>
+          <p:cNvPr id="126" name="" descr=""/>
           <p:cNvPicPr/>
           <p:nvPr/>
         </p:nvPicPr>
@@ -10753,7 +10775,7 @@
       </p:grpSpPr>
       <p:sp>
         <p:nvSpPr>
-          <p:cNvPr id="126" name="Titolo 1"/>
+          <p:cNvPr id="127" name="Titolo 1"/>
           <p:cNvSpPr/>
           <p:nvPr/>
         </p:nvSpPr>
@@ -10776,162 +10798,6 @@
           <a:effectRef idx="0"/>
           <a:fontRef idx="minor"/>
         </p:style>
-      </p:sp>
-      <p:sp>
-        <p:nvSpPr>
-          <p:cNvPr id="127" name="CasellaDiTesto 2"/>
-          <p:cNvSpPr/>
-          <p:nvPr/>
-        </p:nvSpPr>
-        <p:spPr>
-          <a:xfrm>
-            <a:off x="779040" y="2660400"/>
-            <a:ext cx="7483320" cy="1918440"/>
-          </a:xfrm>
-          <a:prstGeom prst="rect">
-            <a:avLst/>
-          </a:prstGeom>
-          <a:noFill/>
-          <a:ln w="0">
-            <a:noFill/>
-          </a:ln>
-        </p:spPr>
-        <p:style>
-          <a:lnRef idx="0"/>
-          <a:fillRef idx="0"/>
-          <a:effectRef idx="0"/>
-          <a:fontRef idx="minor"/>
-        </p:style>
-        <p:txBody>
-          <a:bodyPr lIns="90000" rIns="90000" tIns="45000" bIns="45000" anchor="t">
-            <a:spAutoFit/>
-          </a:bodyPr>
-          <a:p>
-            <a:pPr marL="285840" indent="-285840">
-              <a:lnSpc>
-                <a:spcPct val="100000"/>
-              </a:lnSpc>
-              <a:buClr>
-                <a:srgbClr val="ffffff"/>
-              </a:buClr>
-              <a:buFont typeface="Courier New"/>
-              <a:buChar char="o"/>
-            </a:pPr>
-            <a:r>
-              <a:rPr b="0" lang="it-IT" sz="2400" spc="-1" strike="noStrike">
-                <a:solidFill>
-                  <a:srgbClr val="5b277d"/>
-                </a:solidFill>
-                <a:latin typeface="Calibri"/>
-                <a:ea typeface="DejaVu Sans"/>
-              </a:rPr>
-              <a:t>Pettingzoo</a:t>
-            </a:r>
-            <a:endParaRPr b="0" lang="it-IT" sz="2400" spc="-1" strike="noStrike">
-              <a:latin typeface="Arial"/>
-            </a:endParaRPr>
-          </a:p>
-          <a:p>
-            <a:pPr marL="285840" indent="-285840">
-              <a:lnSpc>
-                <a:spcPct val="100000"/>
-              </a:lnSpc>
-              <a:buClr>
-                <a:srgbClr val="ffffff"/>
-              </a:buClr>
-              <a:buFont typeface="Courier New"/>
-              <a:buChar char="o"/>
-            </a:pPr>
-            <a:r>
-              <a:rPr b="0" lang="it-IT" sz="2400" spc="-1" strike="noStrike">
-                <a:solidFill>
-                  <a:srgbClr val="5b277d"/>
-                </a:solidFill>
-                <a:latin typeface="Calibri"/>
-                <a:ea typeface="DejaVu Sans"/>
-              </a:rPr>
-              <a:t>Simsuite</a:t>
-            </a:r>
-            <a:endParaRPr b="0" lang="it-IT" sz="2400" spc="-1" strike="noStrike">
-              <a:latin typeface="Arial"/>
-            </a:endParaRPr>
-          </a:p>
-          <a:p>
-            <a:pPr marL="285840" indent="-285840">
-              <a:lnSpc>
-                <a:spcPct val="100000"/>
-              </a:lnSpc>
-              <a:buClr>
-                <a:srgbClr val="ffffff"/>
-              </a:buClr>
-              <a:buFont typeface="Courier New"/>
-              <a:buChar char="o"/>
-            </a:pPr>
-            <a:r>
-              <a:rPr b="0" lang="it-IT" sz="2400" spc="-1" strike="noStrike">
-                <a:solidFill>
-                  <a:srgbClr val="5b277d"/>
-                </a:solidFill>
-                <a:latin typeface="Calibri"/>
-                <a:ea typeface="DejaVu Sans"/>
-              </a:rPr>
-              <a:t>Gymnasium</a:t>
-            </a:r>
-            <a:endParaRPr b="0" lang="it-IT" sz="2400" spc="-1" strike="noStrike">
-              <a:latin typeface="Arial"/>
-            </a:endParaRPr>
-          </a:p>
-          <a:p>
-            <a:pPr marL="285840" indent="-285840">
-              <a:lnSpc>
-                <a:spcPct val="100000"/>
-              </a:lnSpc>
-              <a:buClr>
-                <a:srgbClr val="ffffff"/>
-              </a:buClr>
-              <a:buFont typeface="Courier New"/>
-              <a:buChar char="o"/>
-            </a:pPr>
-            <a:r>
-              <a:rPr b="0" lang="it-IT" sz="2400" spc="-1" strike="noStrike">
-                <a:solidFill>
-                  <a:srgbClr val="5b277d"/>
-                </a:solidFill>
-                <a:latin typeface="Calibri"/>
-                <a:ea typeface="DejaVu Sans"/>
-              </a:rPr>
-              <a:t>Ray </a:t>
-            </a:r>
-            <a:endParaRPr b="0" lang="it-IT" sz="2400" spc="-1" strike="noStrike">
-              <a:latin typeface="Arial"/>
-            </a:endParaRPr>
-          </a:p>
-          <a:p>
-            <a:pPr marL="285840" indent="-285840">
-              <a:lnSpc>
-                <a:spcPct val="100000"/>
-              </a:lnSpc>
-              <a:buClr>
-                <a:srgbClr val="ffffff"/>
-              </a:buClr>
-              <a:buFont typeface="Courier New"/>
-              <a:buChar char="o"/>
-            </a:pPr>
-            <a:r>
-              <a:rPr b="0" lang="it-IT" sz="2400" spc="-1" strike="noStrike">
-                <a:solidFill>
-                  <a:srgbClr val="5b277d"/>
-                </a:solidFill>
-                <a:latin typeface="Calibri"/>
-                <a:ea typeface="DejaVu Sans"/>
-              </a:rPr>
-              <a:t>RLlib</a:t>
-            </a:r>
-            <a:endParaRPr b="0" lang="it-IT" sz="2400" spc="-1" strike="noStrike">
-              <a:latin typeface="Arial"/>
-            </a:endParaRPr>
-          </a:p>
-        </p:txBody>
       </p:sp>
       <p:sp>
         <p:nvSpPr>
@@ -11103,6 +10969,236 @@
           </a:ln>
         </p:spPr>
       </p:pic>
+      <p:sp>
+        <p:nvSpPr>
+          <p:cNvPr id="132" name=""/>
+          <p:cNvSpPr/>
+          <p:nvPr/>
+        </p:nvSpPr>
+        <p:spPr>
+          <a:xfrm>
+            <a:off x="426600" y="2485440"/>
+            <a:ext cx="2453400" cy="2374560"/>
+          </a:xfrm>
+          <a:custGeom>
+            <a:avLst/>
+            <a:gdLst/>
+            <a:ahLst/>
+            <a:rect l="l" t="t" r="r" b="b"/>
+            <a:pathLst>
+              <a:path w="21600" h="23261">
+                <a:moveTo>
+                  <a:pt x="3600" y="0"/>
+                </a:moveTo>
+                <a:arcTo wR="3600" hR="3600" stAng="16200000" swAng="-5400000"/>
+                <a:lnTo>
+                  <a:pt x="0" y="19661"/>
+                </a:lnTo>
+                <a:arcTo wR="3600" hR="1939" stAng="10800000" swAng="-5400000"/>
+                <a:lnTo>
+                  <a:pt x="18000" y="21600"/>
+                </a:lnTo>
+                <a:arcTo wR="3600" hR="1939" stAng="5400000" swAng="-5400000"/>
+                <a:lnTo>
+                  <a:pt x="21600" y="3600"/>
+                </a:lnTo>
+                <a:arcTo wR="3600" hR="3600" stAng="0" swAng="-5400000"/>
+                <a:close/>
+              </a:path>
+            </a:pathLst>
+          </a:custGeom>
+          <a:solidFill>
+            <a:srgbClr val="ffffd7"/>
+          </a:solidFill>
+          <a:ln w="0">
+            <a:solidFill>
+              <a:srgbClr val="3465a4"/>
+            </a:solidFill>
+          </a:ln>
+        </p:spPr>
+        <p:style>
+          <a:lnRef idx="0"/>
+          <a:fillRef idx="0"/>
+          <a:effectRef idx="0"/>
+          <a:fontRef idx="minor"/>
+        </p:style>
+      </p:sp>
+      <p:sp>
+        <p:nvSpPr>
+          <p:cNvPr id="133" name="CasellaDiTesto 2"/>
+          <p:cNvSpPr/>
+          <p:nvPr/>
+        </p:nvSpPr>
+        <p:spPr>
+          <a:xfrm>
+            <a:off x="436680" y="2581560"/>
+            <a:ext cx="7483320" cy="1918440"/>
+          </a:xfrm>
+          <a:prstGeom prst="rect">
+            <a:avLst/>
+          </a:prstGeom>
+          <a:noFill/>
+          <a:ln w="0">
+            <a:noFill/>
+          </a:ln>
+        </p:spPr>
+        <p:style>
+          <a:lnRef idx="0"/>
+          <a:fillRef idx="0"/>
+          <a:effectRef idx="0"/>
+          <a:fontRef idx="minor"/>
+        </p:style>
+        <p:txBody>
+          <a:bodyPr lIns="90000" rIns="90000" tIns="45000" bIns="45000" anchor="t">
+            <a:spAutoFit/>
+          </a:bodyPr>
+          <a:p>
+            <a:pPr marL="285840" indent="-285840">
+              <a:lnSpc>
+                <a:spcPct val="100000"/>
+              </a:lnSpc>
+              <a:buClr>
+                <a:srgbClr val="ffffff"/>
+              </a:buClr>
+              <a:buFont typeface="Courier New"/>
+              <a:buChar char="o"/>
+            </a:pPr>
+            <a:r>
+              <a:rPr b="0" lang="it-IT" sz="2400" spc="-1" strike="noStrike">
+                <a:solidFill>
+                  <a:srgbClr val="5b277d"/>
+                </a:solidFill>
+                <a:latin typeface="Calibri"/>
+                <a:ea typeface="DejaVu Sans"/>
+              </a:rPr>
+              <a:t>Pettingz</a:t>
+            </a:r>
+            <a:r>
+              <a:rPr b="0" lang="it-IT" sz="2400" spc="-1" strike="noStrike">
+                <a:solidFill>
+                  <a:srgbClr val="5b277d"/>
+                </a:solidFill>
+                <a:latin typeface="Calibri"/>
+                <a:ea typeface="DejaVu Sans"/>
+              </a:rPr>
+              <a:t>oo</a:t>
+            </a:r>
+            <a:endParaRPr b="0" lang="it-IT" sz="2400" spc="-1" strike="noStrike">
+              <a:latin typeface="Arial"/>
+            </a:endParaRPr>
+          </a:p>
+          <a:p>
+            <a:pPr marL="285840" indent="-285840">
+              <a:lnSpc>
+                <a:spcPct val="100000"/>
+              </a:lnSpc>
+              <a:buClr>
+                <a:srgbClr val="ffffff"/>
+              </a:buClr>
+              <a:buFont typeface="Courier New"/>
+              <a:buChar char="o"/>
+            </a:pPr>
+            <a:r>
+              <a:rPr b="0" lang="it-IT" sz="2400" spc="-1" strike="noStrike">
+                <a:solidFill>
+                  <a:srgbClr val="5b277d"/>
+                </a:solidFill>
+                <a:latin typeface="Calibri"/>
+                <a:ea typeface="DejaVu Sans"/>
+              </a:rPr>
+              <a:t>Simsuite</a:t>
+            </a:r>
+            <a:endParaRPr b="0" lang="it-IT" sz="2400" spc="-1" strike="noStrike">
+              <a:latin typeface="Arial"/>
+            </a:endParaRPr>
+          </a:p>
+          <a:p>
+            <a:pPr marL="285840" indent="-285840">
+              <a:lnSpc>
+                <a:spcPct val="100000"/>
+              </a:lnSpc>
+              <a:buClr>
+                <a:srgbClr val="ffffff"/>
+              </a:buClr>
+              <a:buFont typeface="Courier New"/>
+              <a:buChar char="o"/>
+            </a:pPr>
+            <a:r>
+              <a:rPr b="0" lang="it-IT" sz="2400" spc="-1" strike="noStrike">
+                <a:solidFill>
+                  <a:srgbClr val="5b277d"/>
+                </a:solidFill>
+                <a:latin typeface="Calibri"/>
+                <a:ea typeface="DejaVu Sans"/>
+              </a:rPr>
+              <a:t>Gymnasi</a:t>
+            </a:r>
+            <a:r>
+              <a:rPr b="0" lang="it-IT" sz="2400" spc="-1" strike="noStrike">
+                <a:solidFill>
+                  <a:srgbClr val="5b277d"/>
+                </a:solidFill>
+                <a:latin typeface="Calibri"/>
+                <a:ea typeface="DejaVu Sans"/>
+              </a:rPr>
+              <a:t>um</a:t>
+            </a:r>
+            <a:endParaRPr b="0" lang="it-IT" sz="2400" spc="-1" strike="noStrike">
+              <a:latin typeface="Arial"/>
+            </a:endParaRPr>
+          </a:p>
+          <a:p>
+            <a:pPr marL="285840" indent="-285840">
+              <a:lnSpc>
+                <a:spcPct val="100000"/>
+              </a:lnSpc>
+              <a:buClr>
+                <a:srgbClr val="ffffff"/>
+              </a:buClr>
+              <a:buFont typeface="Courier New"/>
+              <a:buChar char="o"/>
+            </a:pPr>
+            <a:r>
+              <a:rPr b="0" lang="it-IT" sz="2400" spc="-1" strike="noStrike">
+                <a:solidFill>
+                  <a:srgbClr val="5b277d"/>
+                </a:solidFill>
+                <a:latin typeface="Calibri"/>
+                <a:ea typeface="DejaVu Sans"/>
+              </a:rPr>
+              <a:t>Ray </a:t>
+            </a:r>
+            <a:endParaRPr b="0" lang="it-IT" sz="2400" spc="-1" strike="noStrike">
+              <a:latin typeface="Arial"/>
+            </a:endParaRPr>
+          </a:p>
+          <a:p>
+            <a:pPr marL="285840" indent="-285840">
+              <a:lnSpc>
+                <a:spcPct val="100000"/>
+              </a:lnSpc>
+              <a:buClr>
+                <a:srgbClr val="ffffff"/>
+              </a:buClr>
+              <a:buFont typeface="Courier New"/>
+              <a:buChar char="o"/>
+            </a:pPr>
+            <a:r>
+              <a:rPr b="0" lang="it-IT" sz="2400" spc="-1" strike="noStrike">
+                <a:solidFill>
+                  <a:srgbClr val="5b277d"/>
+                </a:solidFill>
+                <a:latin typeface="Calibri"/>
+                <a:ea typeface="DejaVu Sans"/>
+              </a:rPr>
+              <a:t>RLlib</a:t>
+            </a:r>
+            <a:endParaRPr b="0" lang="it-IT" sz="2400" spc="-1" strike="noStrike">
+              <a:latin typeface="Arial"/>
+            </a:endParaRPr>
+          </a:p>
+        </p:txBody>
+      </p:sp>
     </p:spTree>
   </p:cSld>
   <mc:AlternateContent>

</xml_diff>